<commit_message>
added presentation final slides
</commit_message>
<xml_diff>
--- a/presentations/Healthcare-Predictive-Analytics-Lung-Disease-Outbreak-Prediction.pptx
+++ b/presentations/Healthcare-Predictive-Analytics-Lung-Disease-Outbreak-Prediction.pptx
@@ -1759,8 +1759,27 @@
                 <a:ea typeface="adonis-web" pitchFamily="34" charset="-122"/>
                 <a:cs typeface="adonis-web" pitchFamily="34" charset="-120"/>
               </a:rPr>
-              <a:t>Healthcare Predictive Analysis</a:t>
-            </a:r>
+              <a:t>Healthcare </a:t>
+            </a:r>
+            <a:r>
+              <a:rPr lang="en-US" sz="6000" kern="0" spc="-35">
+                <a:solidFill>
+                  <a:srgbClr val="000000"/>
+                </a:solidFill>
+                <a:latin typeface="adonis-web" pitchFamily="34" charset="0"/>
+                <a:ea typeface="adonis-web" pitchFamily="34" charset="-122"/>
+                <a:cs typeface="adonis-web" pitchFamily="34" charset="-120"/>
+              </a:rPr>
+              <a:t>Predictive Analysis</a:t>
+            </a:r>
+            <a:endParaRPr lang="en-US" sz="6000" kern="0" spc="-35" dirty="0">
+              <a:solidFill>
+                <a:srgbClr val="000000"/>
+              </a:solidFill>
+              <a:latin typeface="adonis-web" pitchFamily="34" charset="0"/>
+              <a:ea typeface="adonis-web" pitchFamily="34" charset="-122"/>
+              <a:cs typeface="adonis-web" pitchFamily="34" charset="-120"/>
+            </a:endParaRPr>
           </a:p>
           <a:p>
             <a:pPr marL="0" indent="0">
@@ -3009,7 +3028,27 @@
                 <a:ea typeface="Source Sans Pro" pitchFamily="34" charset="-122"/>
                 <a:cs typeface="Source Sans Pro" pitchFamily="34" charset="-120"/>
               </a:rPr>
-              <a:t>By leveraging the power of predictive modeling, the healthcare industry can take significant strides towards improving patient outcomes and enhancing public health on a global scale</a:t>
+              <a:t>By </a:t>
+            </a:r>
+            <a:r>
+              <a:rPr lang="en-US" sz="2400" kern="0" spc="-35" dirty="0" err="1">
+                <a:solidFill>
+                  <a:srgbClr val="272525"/>
+                </a:solidFill>
+                <a:ea typeface="Source Sans Pro" pitchFamily="34" charset="-122"/>
+                <a:cs typeface="Source Sans Pro" pitchFamily="34" charset="-120"/>
+              </a:rPr>
+              <a:t>analysing</a:t>
+            </a:r>
+            <a:r>
+              <a:rPr lang="en-US" sz="2400" kern="0" spc="-35" dirty="0">
+                <a:solidFill>
+                  <a:srgbClr val="272525"/>
+                </a:solidFill>
+                <a:ea typeface="Source Sans Pro" pitchFamily="34" charset="-122"/>
+                <a:cs typeface="Source Sans Pro" pitchFamily="34" charset="-120"/>
+              </a:rPr>
+              <a:t> the power of predictive modeling, the healthcare industry can take significant strides towards improving patient outcomes and enhancing public health on a global scale</a:t>
             </a:r>
             <a:endParaRPr lang="en-US" sz="2400" dirty="0"/>
           </a:p>
@@ -7872,9 +7911,88 @@
           </a:p>
         </p:txBody>
       </p:sp>
+      <p:sp>
+        <p:nvSpPr>
+          <p:cNvPr id="9" name="Text 4"/>
+          <p:cNvSpPr/>
+          <p:nvPr/>
+        </p:nvSpPr>
+        <p:spPr>
+          <a:xfrm>
+            <a:off x="8275082" y="6220182"/>
+            <a:ext cx="3332917" cy="416481"/>
+          </a:xfrm>
+          <a:prstGeom prst="rect">
+            <a:avLst/>
+          </a:prstGeom>
+          <a:noFill/>
+          <a:ln/>
+        </p:spPr>
+        <p:txBody>
+          <a:bodyPr wrap="none" rtlCol="0" anchor="t"/>
+          <a:lstStyle/>
+          <a:p>
+            <a:pPr marL="0" indent="0" algn="ctr">
+              <a:lnSpc>
+                <a:spcPts val="3281"/>
+              </a:lnSpc>
+              <a:buNone/>
+            </a:pPr>
+            <a:r>
+              <a:rPr lang="en-US" sz="2624" b="1" kern="0" spc="-35" dirty="0">
+                <a:solidFill>
+                  <a:srgbClr val="000000"/>
+                </a:solidFill>
+                <a:latin typeface="adonis-web" pitchFamily="34" charset="0"/>
+                <a:ea typeface="adonis-web" pitchFamily="34" charset="-122"/>
+                <a:cs typeface="adonis-web" pitchFamily="34" charset="-120"/>
+              </a:rPr>
+              <a:t>MobileNet Model</a:t>
+            </a:r>
+            <a:endParaRPr lang="en-US" sz="2624" dirty="0"/>
+          </a:p>
+        </p:txBody>
+      </p:sp>
+      <p:sp>
+        <p:nvSpPr>
+          <p:cNvPr id="10" name="Text 5"/>
+          <p:cNvSpPr/>
+          <p:nvPr/>
+        </p:nvSpPr>
+        <p:spPr>
+          <a:xfrm>
+            <a:off x="7593687" y="6858833"/>
+            <a:ext cx="4695706" cy="355402"/>
+          </a:xfrm>
+          <a:prstGeom prst="rect">
+            <a:avLst/>
+          </a:prstGeom>
+          <a:noFill/>
+          <a:ln/>
+        </p:spPr>
+        <p:txBody>
+          <a:bodyPr wrap="none" rtlCol="0" anchor="t"/>
+          <a:lstStyle/>
+          <a:p>
+            <a:pPr marL="0" indent="0" algn="ctr">
+              <a:lnSpc>
+                <a:spcPts val="2799"/>
+              </a:lnSpc>
+              <a:buNone/>
+            </a:pPr>
+            <a:endParaRPr lang="en-US" sz="1750" dirty="0"/>
+          </a:p>
+        </p:txBody>
+      </p:sp>
       <p:pic>
         <p:nvPicPr>
-          <p:cNvPr id="8" name="Image 2" descr="preencoded.png"/>
+          <p:cNvPr id="14" name="Picture 13">
+            <a:extLst>
+              <a:ext uri="{FF2B5EF4-FFF2-40B4-BE49-F238E27FC236}">
+                <a16:creationId xmlns:a16="http://schemas.microsoft.com/office/drawing/2014/main" id="{54E72E7F-5CE8-08AB-7C1D-45FC47A4A744}"/>
+              </a:ext>
+            </a:extLst>
+          </p:cNvPr>
           <p:cNvPicPr>
             <a:picLocks noChangeAspect="1"/>
           </p:cNvPicPr>
@@ -7889,86 +8007,13 @@
         <p:spPr>
           <a:xfrm>
             <a:off x="7593687" y="2093000"/>
-            <a:ext cx="4695706" cy="3877270"/>
+            <a:ext cx="5191324" cy="3877270"/>
           </a:xfrm>
           <a:prstGeom prst="rect">
             <a:avLst/>
           </a:prstGeom>
         </p:spPr>
       </p:pic>
-      <p:sp>
-        <p:nvSpPr>
-          <p:cNvPr id="9" name="Text 4"/>
-          <p:cNvSpPr/>
-          <p:nvPr/>
-        </p:nvSpPr>
-        <p:spPr>
-          <a:xfrm>
-            <a:off x="8275082" y="6220182"/>
-            <a:ext cx="3332917" cy="416481"/>
-          </a:xfrm>
-          <a:prstGeom prst="rect">
-            <a:avLst/>
-          </a:prstGeom>
-          <a:noFill/>
-          <a:ln/>
-        </p:spPr>
-        <p:txBody>
-          <a:bodyPr wrap="none" rtlCol="0" anchor="t"/>
-          <a:lstStyle/>
-          <a:p>
-            <a:pPr marL="0" indent="0" algn="ctr">
-              <a:lnSpc>
-                <a:spcPts val="3281"/>
-              </a:lnSpc>
-              <a:buNone/>
-            </a:pPr>
-            <a:r>
-              <a:rPr lang="en-US" sz="2624" b="1" kern="0" spc="-35" dirty="0">
-                <a:solidFill>
-                  <a:srgbClr val="000000"/>
-                </a:solidFill>
-                <a:latin typeface="adonis-web" pitchFamily="34" charset="0"/>
-                <a:ea typeface="adonis-web" pitchFamily="34" charset="-122"/>
-                <a:cs typeface="adonis-web" pitchFamily="34" charset="-120"/>
-              </a:rPr>
-              <a:t>MobileNet Model</a:t>
-            </a:r>
-            <a:endParaRPr lang="en-US" sz="2624" dirty="0"/>
-          </a:p>
-        </p:txBody>
-      </p:sp>
-      <p:sp>
-        <p:nvSpPr>
-          <p:cNvPr id="10" name="Text 5"/>
-          <p:cNvSpPr/>
-          <p:nvPr/>
-        </p:nvSpPr>
-        <p:spPr>
-          <a:xfrm>
-            <a:off x="7593687" y="6858833"/>
-            <a:ext cx="4695706" cy="355402"/>
-          </a:xfrm>
-          <a:prstGeom prst="rect">
-            <a:avLst/>
-          </a:prstGeom>
-          <a:noFill/>
-          <a:ln/>
-        </p:spPr>
-        <p:txBody>
-          <a:bodyPr wrap="none" rtlCol="0" anchor="t"/>
-          <a:lstStyle/>
-          <a:p>
-            <a:pPr marL="0" indent="0" algn="ctr">
-              <a:lnSpc>
-                <a:spcPts val="2799"/>
-              </a:lnSpc>
-              <a:buNone/>
-            </a:pPr>
-            <a:endParaRPr lang="en-US" sz="1750" dirty="0"/>
-          </a:p>
-        </p:txBody>
-      </p:sp>
     </p:spTree>
   </p:cSld>
   <p:clrMapOvr>

</xml_diff>